<commit_message>
updated ppt and deleted previous versions
</commit_message>
<xml_diff>
--- a/Final_Presentation_4.1.pptx
+++ b/Final_Presentation_4.1.pptx
@@ -144,7 +144,7 @@
   <pc:docChgLst>
     <pc:chgData name="Amelia Corea" userId="0f927ba03023ffb6" providerId="LiveId" clId="{BBC10E33-75ED-4024-95F2-63D9941E52A0}"/>
     <pc:docChg chg="custSel modSld sldOrd">
-      <pc:chgData name="Amelia Corea" userId="0f927ba03023ffb6" providerId="LiveId" clId="{BBC10E33-75ED-4024-95F2-63D9941E52A0}" dt="2021-10-30T00:15:03.134" v="100" actId="20577"/>
+      <pc:chgData name="Amelia Corea" userId="0f927ba03023ffb6" providerId="LiveId" clId="{BBC10E33-75ED-4024-95F2-63D9941E52A0}" dt="2021-10-30T04:36:29.203" v="120" actId="20577"/>
       <pc:docMkLst>
         <pc:docMk/>
       </pc:docMkLst>
@@ -182,6 +182,21 @@
             <pc:docMk/>
             <pc:sldMk cId="3405949825" sldId="270"/>
             <ac:spMk id="3" creationId="{3899BDF4-B543-46C8-9956-BD9969975109}"/>
+          </ac:spMkLst>
+        </pc:spChg>
+      </pc:sldChg>
+      <pc:sldChg chg="modSp mod">
+        <pc:chgData name="Amelia Corea" userId="0f927ba03023ffb6" providerId="LiveId" clId="{BBC10E33-75ED-4024-95F2-63D9941E52A0}" dt="2021-10-30T04:36:29.203" v="120" actId="20577"/>
+        <pc:sldMkLst>
+          <pc:docMk/>
+          <pc:sldMk cId="3983383762" sldId="271"/>
+        </pc:sldMkLst>
+        <pc:spChg chg="mod">
+          <ac:chgData name="Amelia Corea" userId="0f927ba03023ffb6" providerId="LiveId" clId="{BBC10E33-75ED-4024-95F2-63D9941E52A0}" dt="2021-10-30T04:36:29.203" v="120" actId="20577"/>
+          <ac:spMkLst>
+            <pc:docMk/>
+            <pc:sldMk cId="3983383762" sldId="271"/>
+            <ac:spMk id="4" creationId="{86378EFB-539C-419F-A9C9-4F9562513639}"/>
           </ac:spMkLst>
         </pc:spChg>
       </pc:sldChg>
@@ -8493,7 +8508,7 @@
           <a:noFill/>
           <a:extLst>
             <a:ext uri="{909E8E84-426E-40dd-AFC4-6F175D3DCCD1}">
-              <a14:hiddenFill xmlns:a14="http://schemas.microsoft.com/office/drawing/2010/main" xmlns="">
+              <a14:hiddenFill xmlns="" xmlns:a14="http://schemas.microsoft.com/office/drawing/2010/main">
                 <a:solidFill>
                   <a:srgbClr val="FFFFFF"/>
                 </a:solidFill>
@@ -8552,7 +8567,7 @@
             </a:ln>
             <a:extLst>
               <a:ext uri="{91240B29-F687-4f45-9708-019B960494DF}">
-                <a14:hiddenLine xmlns:a14="http://schemas.microsoft.com/office/drawing/2010/main" xmlns="" w="9525">
+                <a14:hiddenLine xmlns="" xmlns:a14="http://schemas.microsoft.com/office/drawing/2010/main" w="9525">
                   <a:solidFill>
                     <a:srgbClr val="000000"/>
                   </a:solidFill>
@@ -8642,7 +8657,7 @@
             </a:ln>
             <a:extLst>
               <a:ext uri="{91240B29-F687-4f45-9708-019B960494DF}">
-                <a14:hiddenLine xmlns:a14="http://schemas.microsoft.com/office/drawing/2010/main" xmlns="" w="9525">
+                <a14:hiddenLine xmlns="" xmlns:a14="http://schemas.microsoft.com/office/drawing/2010/main" w="9525">
                   <a:solidFill>
                     <a:srgbClr val="000000"/>
                   </a:solidFill>
@@ -8732,7 +8747,7 @@
             </a:ln>
             <a:extLst>
               <a:ext uri="{91240B29-F687-4f45-9708-019B960494DF}">
-                <a14:hiddenLine xmlns:a14="http://schemas.microsoft.com/office/drawing/2010/main" xmlns="" w="9525">
+                <a14:hiddenLine xmlns="" xmlns:a14="http://schemas.microsoft.com/office/drawing/2010/main" w="9525">
                   <a:solidFill>
                     <a:srgbClr val="000000"/>
                   </a:solidFill>
@@ -8766,7 +8781,7 @@
             </a:ln>
             <a:extLst>
               <a:ext uri="{91240B29-F687-4f45-9708-019B960494DF}">
-                <a14:hiddenLine xmlns:a14="http://schemas.microsoft.com/office/drawing/2010/main" xmlns="" w="9525">
+                <a14:hiddenLine xmlns="" xmlns:a14="http://schemas.microsoft.com/office/drawing/2010/main" w="9525">
                   <a:solidFill>
                     <a:srgbClr val="000000"/>
                   </a:solidFill>
@@ -8856,7 +8871,7 @@
             </a:ln>
             <a:extLst>
               <a:ext uri="{91240B29-F687-4f45-9708-019B960494DF}">
-                <a14:hiddenLine xmlns:a14="http://schemas.microsoft.com/office/drawing/2010/main" xmlns="" w="9525">
+                <a14:hiddenLine xmlns="" xmlns:a14="http://schemas.microsoft.com/office/drawing/2010/main" w="9525">
                   <a:solidFill>
                     <a:srgbClr val="000000"/>
                   </a:solidFill>
@@ -8918,7 +8933,7 @@
             </a:ln>
             <a:extLst>
               <a:ext uri="{91240B29-F687-4f45-9708-019B960494DF}">
-                <a14:hiddenLine xmlns:a14="http://schemas.microsoft.com/office/drawing/2010/main" xmlns="" w="9525">
+                <a14:hiddenLine xmlns="" xmlns:a14="http://schemas.microsoft.com/office/drawing/2010/main" w="9525">
                   <a:solidFill>
                     <a:srgbClr val="000000"/>
                   </a:solidFill>
@@ -8980,7 +8995,7 @@
             </a:ln>
             <a:extLst>
               <a:ext uri="{91240B29-F687-4f45-9708-019B960494DF}">
-                <a14:hiddenLine xmlns:a14="http://schemas.microsoft.com/office/drawing/2010/main" xmlns="" w="9525">
+                <a14:hiddenLine xmlns="" xmlns:a14="http://schemas.microsoft.com/office/drawing/2010/main" w="9525">
                   <a:solidFill>
                     <a:srgbClr val="000000"/>
                   </a:solidFill>
@@ -9070,7 +9085,7 @@
             </a:ln>
             <a:extLst>
               <a:ext uri="{91240B29-F687-4f45-9708-019B960494DF}">
-                <a14:hiddenLine xmlns:a14="http://schemas.microsoft.com/office/drawing/2010/main" xmlns="" w="9525">
+                <a14:hiddenLine xmlns="" xmlns:a14="http://schemas.microsoft.com/office/drawing/2010/main" w="9525">
                   <a:solidFill>
                     <a:srgbClr val="000000"/>
                   </a:solidFill>
@@ -9132,7 +9147,7 @@
             </a:ln>
             <a:extLst>
               <a:ext uri="{91240B29-F687-4f45-9708-019B960494DF}">
-                <a14:hiddenLine xmlns:a14="http://schemas.microsoft.com/office/drawing/2010/main" xmlns="" w="9525">
+                <a14:hiddenLine xmlns="" xmlns:a14="http://schemas.microsoft.com/office/drawing/2010/main" w="9525">
                   <a:solidFill>
                     <a:srgbClr val="000000"/>
                   </a:solidFill>
@@ -9194,7 +9209,7 @@
             </a:ln>
             <a:extLst>
               <a:ext uri="{91240B29-F687-4f45-9708-019B960494DF}">
-                <a14:hiddenLine xmlns:a14="http://schemas.microsoft.com/office/drawing/2010/main" xmlns="" w="9525">
+                <a14:hiddenLine xmlns="" xmlns:a14="http://schemas.microsoft.com/office/drawing/2010/main" w="9525">
                   <a:solidFill>
                     <a:srgbClr val="000000"/>
                   </a:solidFill>
@@ -9284,7 +9299,7 @@
             </a:ln>
             <a:extLst>
               <a:ext uri="{91240B29-F687-4f45-9708-019B960494DF}">
-                <a14:hiddenLine xmlns:a14="http://schemas.microsoft.com/office/drawing/2010/main" xmlns="" w="9525">
+                <a14:hiddenLine xmlns="" xmlns:a14="http://schemas.microsoft.com/office/drawing/2010/main" w="9525">
                   <a:solidFill>
                     <a:srgbClr val="000000"/>
                   </a:solidFill>
@@ -9374,7 +9389,7 @@
             </a:ln>
             <a:extLst>
               <a:ext uri="{91240B29-F687-4f45-9708-019B960494DF}">
-                <a14:hiddenLine xmlns:a14="http://schemas.microsoft.com/office/drawing/2010/main" xmlns="" w="9525">
+                <a14:hiddenLine xmlns="" xmlns:a14="http://schemas.microsoft.com/office/drawing/2010/main" w="9525">
                   <a:solidFill>
                     <a:srgbClr val="000000"/>
                   </a:solidFill>
@@ -9436,7 +9451,7 @@
             </a:ln>
             <a:extLst>
               <a:ext uri="{91240B29-F687-4f45-9708-019B960494DF}">
-                <a14:hiddenLine xmlns:a14="http://schemas.microsoft.com/office/drawing/2010/main" xmlns="" w="9525">
+                <a14:hiddenLine xmlns="" xmlns:a14="http://schemas.microsoft.com/office/drawing/2010/main" w="9525">
                   <a:solidFill>
                     <a:srgbClr val="000000"/>
                   </a:solidFill>
@@ -9546,7 +9561,7 @@
             </a:ln>
             <a:extLst>
               <a:ext uri="{91240B29-F687-4f45-9708-019B960494DF}">
-                <a14:hiddenLine xmlns:a14="http://schemas.microsoft.com/office/drawing/2010/main" xmlns="" w="9525">
+                <a14:hiddenLine xmlns="" xmlns:a14="http://schemas.microsoft.com/office/drawing/2010/main" w="9525">
                   <a:solidFill>
                     <a:srgbClr val="000000"/>
                   </a:solidFill>
@@ -9608,7 +9623,7 @@
             </a:ln>
             <a:extLst>
               <a:ext uri="{91240B29-F687-4f45-9708-019B960494DF}">
-                <a14:hiddenLine xmlns:a14="http://schemas.microsoft.com/office/drawing/2010/main" xmlns="" w="9525">
+                <a14:hiddenLine xmlns="" xmlns:a14="http://schemas.microsoft.com/office/drawing/2010/main" w="9525">
                   <a:solidFill>
                     <a:srgbClr val="000000"/>
                   </a:solidFill>
@@ -9698,7 +9713,7 @@
             </a:ln>
             <a:extLst>
               <a:ext uri="{91240B29-F687-4f45-9708-019B960494DF}">
-                <a14:hiddenLine xmlns:a14="http://schemas.microsoft.com/office/drawing/2010/main" xmlns="" w="9525">
+                <a14:hiddenLine xmlns="" xmlns:a14="http://schemas.microsoft.com/office/drawing/2010/main" w="9525">
                   <a:solidFill>
                     <a:srgbClr val="000000"/>
                   </a:solidFill>
@@ -9788,7 +9803,7 @@
             </a:ln>
             <a:extLst>
               <a:ext uri="{91240B29-F687-4f45-9708-019B960494DF}">
-                <a14:hiddenLine xmlns:a14="http://schemas.microsoft.com/office/drawing/2010/main" xmlns="" w="9525">
+                <a14:hiddenLine xmlns="" xmlns:a14="http://schemas.microsoft.com/office/drawing/2010/main" w="9525">
                   <a:solidFill>
                     <a:srgbClr val="000000"/>
                   </a:solidFill>
@@ -9850,7 +9865,7 @@
             </a:ln>
             <a:extLst>
               <a:ext uri="{91240B29-F687-4f45-9708-019B960494DF}">
-                <a14:hiddenLine xmlns:a14="http://schemas.microsoft.com/office/drawing/2010/main" xmlns="" w="9525">
+                <a14:hiddenLine xmlns="" xmlns:a14="http://schemas.microsoft.com/office/drawing/2010/main" w="9525">
                   <a:solidFill>
                     <a:srgbClr val="000000"/>
                   </a:solidFill>
@@ -9940,7 +9955,7 @@
             </a:ln>
             <a:extLst>
               <a:ext uri="{91240B29-F687-4f45-9708-019B960494DF}">
-                <a14:hiddenLine xmlns:a14="http://schemas.microsoft.com/office/drawing/2010/main" xmlns="" w="9525">
+                <a14:hiddenLine xmlns="" xmlns:a14="http://schemas.microsoft.com/office/drawing/2010/main" w="9525">
                   <a:solidFill>
                     <a:srgbClr val="000000"/>
                   </a:solidFill>
@@ -10030,7 +10045,7 @@
             </a:ln>
             <a:extLst>
               <a:ext uri="{91240B29-F687-4f45-9708-019B960494DF}">
-                <a14:hiddenLine xmlns:a14="http://schemas.microsoft.com/office/drawing/2010/main" xmlns="" w="9525">
+                <a14:hiddenLine xmlns="" xmlns:a14="http://schemas.microsoft.com/office/drawing/2010/main" w="9525">
                   <a:solidFill>
                     <a:srgbClr val="000000"/>
                   </a:solidFill>
@@ -10086,7 +10101,7 @@
             </a:ln>
             <a:extLst>
               <a:ext uri="{91240B29-F687-4f45-9708-019B960494DF}">
-                <a14:hiddenLine xmlns:a14="http://schemas.microsoft.com/office/drawing/2010/main" xmlns="" w="9525">
+                <a14:hiddenLine xmlns="" xmlns:a14="http://schemas.microsoft.com/office/drawing/2010/main" w="9525">
                   <a:solidFill>
                     <a:srgbClr val="000000"/>
                   </a:solidFill>
@@ -10176,7 +10191,7 @@
             </a:ln>
             <a:extLst>
               <a:ext uri="{91240B29-F687-4f45-9708-019B960494DF}">
-                <a14:hiddenLine xmlns:a14="http://schemas.microsoft.com/office/drawing/2010/main" xmlns="" w="9525">
+                <a14:hiddenLine xmlns="" xmlns:a14="http://schemas.microsoft.com/office/drawing/2010/main" w="9525">
                   <a:solidFill>
                     <a:srgbClr val="000000"/>
                   </a:solidFill>
@@ -10232,7 +10247,7 @@
             </a:ln>
             <a:extLst>
               <a:ext uri="{91240B29-F687-4f45-9708-019B960494DF}">
-                <a14:hiddenLine xmlns:a14="http://schemas.microsoft.com/office/drawing/2010/main" xmlns="" w="9525">
+                <a14:hiddenLine xmlns="" xmlns:a14="http://schemas.microsoft.com/office/drawing/2010/main" w="9525">
                   <a:solidFill>
                     <a:srgbClr val="000000"/>
                   </a:solidFill>
@@ -10322,7 +10337,7 @@
             </a:ln>
             <a:extLst>
               <a:ext uri="{91240B29-F687-4f45-9708-019B960494DF}">
-                <a14:hiddenLine xmlns:a14="http://schemas.microsoft.com/office/drawing/2010/main" xmlns="" w="9525">
+                <a14:hiddenLine xmlns="" xmlns:a14="http://schemas.microsoft.com/office/drawing/2010/main" w="9525">
                   <a:solidFill>
                     <a:srgbClr val="000000"/>
                   </a:solidFill>
@@ -10390,7 +10405,7 @@
             </a:ln>
             <a:extLst>
               <a:ext uri="{91240B29-F687-4f45-9708-019B960494DF}">
-                <a14:hiddenLine xmlns:a14="http://schemas.microsoft.com/office/drawing/2010/main" xmlns="" w="9525">
+                <a14:hiddenLine xmlns="" xmlns:a14="http://schemas.microsoft.com/office/drawing/2010/main" w="9525">
                   <a:solidFill>
                     <a:srgbClr val="000000"/>
                   </a:solidFill>
@@ -10480,7 +10495,7 @@
             </a:ln>
             <a:extLst>
               <a:ext uri="{91240B29-F687-4f45-9708-019B960494DF}">
-                <a14:hiddenLine xmlns:a14="http://schemas.microsoft.com/office/drawing/2010/main" xmlns="" w="9525">
+                <a14:hiddenLine xmlns="" xmlns:a14="http://schemas.microsoft.com/office/drawing/2010/main" w="9525">
                   <a:solidFill>
                     <a:srgbClr val="000000"/>
                   </a:solidFill>
@@ -10548,7 +10563,7 @@
             </a:ln>
             <a:extLst>
               <a:ext uri="{91240B29-F687-4f45-9708-019B960494DF}">
-                <a14:hiddenLine xmlns:a14="http://schemas.microsoft.com/office/drawing/2010/main" xmlns="" w="9525">
+                <a14:hiddenLine xmlns="" xmlns:a14="http://schemas.microsoft.com/office/drawing/2010/main" w="9525">
                   <a:solidFill>
                     <a:srgbClr val="000000"/>
                   </a:solidFill>
@@ -10638,7 +10653,7 @@
             </a:ln>
             <a:extLst>
               <a:ext uri="{91240B29-F687-4f45-9708-019B960494DF}">
-                <a14:hiddenLine xmlns:a14="http://schemas.microsoft.com/office/drawing/2010/main" xmlns="" w="9525">
+                <a14:hiddenLine xmlns="" xmlns:a14="http://schemas.microsoft.com/office/drawing/2010/main" w="9525">
                   <a:solidFill>
                     <a:srgbClr val="000000"/>
                   </a:solidFill>
@@ -10672,7 +10687,7 @@
             </a:ln>
             <a:extLst>
               <a:ext uri="{91240B29-F687-4f45-9708-019B960494DF}">
-                <a14:hiddenLine xmlns:a14="http://schemas.microsoft.com/office/drawing/2010/main" xmlns="" w="9525">
+                <a14:hiddenLine xmlns="" xmlns:a14="http://schemas.microsoft.com/office/drawing/2010/main" w="9525">
                   <a:solidFill>
                     <a:srgbClr val="000000"/>
                   </a:solidFill>
@@ -10762,7 +10777,7 @@
             </a:ln>
             <a:extLst>
               <a:ext uri="{91240B29-F687-4f45-9708-019B960494DF}">
-                <a14:hiddenLine xmlns:a14="http://schemas.microsoft.com/office/drawing/2010/main" xmlns="" w="9525">
+                <a14:hiddenLine xmlns="" xmlns:a14="http://schemas.microsoft.com/office/drawing/2010/main" w="9525">
                   <a:solidFill>
                     <a:srgbClr val="000000"/>
                   </a:solidFill>
@@ -10824,7 +10839,7 @@
             </a:ln>
             <a:extLst>
               <a:ext uri="{91240B29-F687-4f45-9708-019B960494DF}">
-                <a14:hiddenLine xmlns:a14="http://schemas.microsoft.com/office/drawing/2010/main" xmlns="" w="9525">
+                <a14:hiddenLine xmlns="" xmlns:a14="http://schemas.microsoft.com/office/drawing/2010/main" w="9525">
                   <a:solidFill>
                     <a:srgbClr val="000000"/>
                   </a:solidFill>
@@ -10886,7 +10901,7 @@
             </a:ln>
             <a:extLst>
               <a:ext uri="{91240B29-F687-4f45-9708-019B960494DF}">
-                <a14:hiddenLine xmlns:a14="http://schemas.microsoft.com/office/drawing/2010/main" xmlns="" w="9525">
+                <a14:hiddenLine xmlns="" xmlns:a14="http://schemas.microsoft.com/office/drawing/2010/main" w="9525">
                   <a:solidFill>
                     <a:srgbClr val="000000"/>
                   </a:solidFill>
@@ -10976,7 +10991,7 @@
             </a:ln>
             <a:extLst>
               <a:ext uri="{91240B29-F687-4f45-9708-019B960494DF}">
-                <a14:hiddenLine xmlns:a14="http://schemas.microsoft.com/office/drawing/2010/main" xmlns="" w="9525">
+                <a14:hiddenLine xmlns="" xmlns:a14="http://schemas.microsoft.com/office/drawing/2010/main" w="9525">
                   <a:solidFill>
                     <a:srgbClr val="000000"/>
                   </a:solidFill>
@@ -11044,7 +11059,7 @@
             </a:ln>
             <a:extLst>
               <a:ext uri="{91240B29-F687-4f45-9708-019B960494DF}">
-                <a14:hiddenLine xmlns:a14="http://schemas.microsoft.com/office/drawing/2010/main" xmlns="" w="9525">
+                <a14:hiddenLine xmlns="" xmlns:a14="http://schemas.microsoft.com/office/drawing/2010/main" w="9525">
                   <a:solidFill>
                     <a:srgbClr val="000000"/>
                   </a:solidFill>
@@ -11106,7 +11121,7 @@
             </a:ln>
             <a:extLst>
               <a:ext uri="{91240B29-F687-4f45-9708-019B960494DF}">
-                <a14:hiddenLine xmlns:a14="http://schemas.microsoft.com/office/drawing/2010/main" xmlns="" w="9525">
+                <a14:hiddenLine xmlns="" xmlns:a14="http://schemas.microsoft.com/office/drawing/2010/main" w="9525">
                   <a:solidFill>
                     <a:srgbClr val="000000"/>
                   </a:solidFill>
@@ -11196,7 +11211,7 @@
             </a:ln>
             <a:extLst>
               <a:ext uri="{91240B29-F687-4f45-9708-019B960494DF}">
-                <a14:hiddenLine xmlns:a14="http://schemas.microsoft.com/office/drawing/2010/main" xmlns="" w="9525">
+                <a14:hiddenLine xmlns="" xmlns:a14="http://schemas.microsoft.com/office/drawing/2010/main" w="9525">
                   <a:solidFill>
                     <a:srgbClr val="000000"/>
                   </a:solidFill>
@@ -11258,7 +11273,7 @@
             </a:ln>
             <a:extLst>
               <a:ext uri="{91240B29-F687-4f45-9708-019B960494DF}">
-                <a14:hiddenLine xmlns:a14="http://schemas.microsoft.com/office/drawing/2010/main" xmlns="" w="9525">
+                <a14:hiddenLine xmlns="" xmlns:a14="http://schemas.microsoft.com/office/drawing/2010/main" w="9525">
                   <a:solidFill>
                     <a:srgbClr val="000000"/>
                   </a:solidFill>
@@ -11348,7 +11363,7 @@
             </a:ln>
             <a:extLst>
               <a:ext uri="{91240B29-F687-4f45-9708-019B960494DF}">
-                <a14:hiddenLine xmlns:a14="http://schemas.microsoft.com/office/drawing/2010/main" xmlns="" w="9525">
+                <a14:hiddenLine xmlns="" xmlns:a14="http://schemas.microsoft.com/office/drawing/2010/main" w="9525">
                   <a:solidFill>
                     <a:srgbClr val="000000"/>
                   </a:solidFill>
@@ -11410,7 +11425,7 @@
             </a:ln>
             <a:extLst>
               <a:ext uri="{91240B29-F687-4f45-9708-019B960494DF}">
-                <a14:hiddenLine xmlns:a14="http://schemas.microsoft.com/office/drawing/2010/main" xmlns="" w="9525">
+                <a14:hiddenLine xmlns="" xmlns:a14="http://schemas.microsoft.com/office/drawing/2010/main" w="9525">
                   <a:solidFill>
                     <a:srgbClr val="000000"/>
                   </a:solidFill>
@@ -11500,7 +11515,7 @@
             </a:ln>
             <a:extLst>
               <a:ext uri="{91240B29-F687-4f45-9708-019B960494DF}">
-                <a14:hiddenLine xmlns:a14="http://schemas.microsoft.com/office/drawing/2010/main" xmlns="" w="9525">
+                <a14:hiddenLine xmlns="" xmlns:a14="http://schemas.microsoft.com/office/drawing/2010/main" w="9525">
                   <a:solidFill>
                     <a:srgbClr val="000000"/>
                   </a:solidFill>
@@ -11534,7 +11549,7 @@
             </a:ln>
             <a:extLst>
               <a:ext uri="{91240B29-F687-4f45-9708-019B960494DF}">
-                <a14:hiddenLine xmlns:a14="http://schemas.microsoft.com/office/drawing/2010/main" xmlns="" w="9525">
+                <a14:hiddenLine xmlns="" xmlns:a14="http://schemas.microsoft.com/office/drawing/2010/main" w="9525">
                   <a:solidFill>
                     <a:srgbClr val="000000"/>
                   </a:solidFill>
@@ -11599,7 +11614,7 @@
             </a:ln>
             <a:extLst>
               <a:ext uri="{91240B29-F687-4f45-9708-019B960494DF}">
-                <a14:hiddenLine xmlns:a14="http://schemas.microsoft.com/office/drawing/2010/main" xmlns="" w="9525">
+                <a14:hiddenLine xmlns="" xmlns:a14="http://schemas.microsoft.com/office/drawing/2010/main" w="9525">
                   <a:solidFill>
                     <a:srgbClr val="000000"/>
                   </a:solidFill>
@@ -11689,7 +11704,7 @@
             </a:ln>
             <a:extLst>
               <a:ext uri="{91240B29-F687-4f45-9708-019B960494DF}">
-                <a14:hiddenLine xmlns:a14="http://schemas.microsoft.com/office/drawing/2010/main" xmlns="" w="9525">
+                <a14:hiddenLine xmlns="" xmlns:a14="http://schemas.microsoft.com/office/drawing/2010/main" w="9525">
                   <a:solidFill>
                     <a:srgbClr val="000000"/>
                   </a:solidFill>
@@ -11751,7 +11766,7 @@
             </a:ln>
             <a:extLst>
               <a:ext uri="{91240B29-F687-4f45-9708-019B960494DF}">
-                <a14:hiddenLine xmlns:a14="http://schemas.microsoft.com/office/drawing/2010/main" xmlns="" w="9525">
+                <a14:hiddenLine xmlns="" xmlns:a14="http://schemas.microsoft.com/office/drawing/2010/main" w="9525">
                   <a:solidFill>
                     <a:srgbClr val="000000"/>
                   </a:solidFill>
@@ -11841,7 +11856,7 @@
             </a:ln>
             <a:extLst>
               <a:ext uri="{91240B29-F687-4f45-9708-019B960494DF}">
-                <a14:hiddenLine xmlns:a14="http://schemas.microsoft.com/office/drawing/2010/main" xmlns="" w="9525">
+                <a14:hiddenLine xmlns="" xmlns:a14="http://schemas.microsoft.com/office/drawing/2010/main" w="9525">
                   <a:solidFill>
                     <a:srgbClr val="000000"/>
                   </a:solidFill>
@@ -11931,7 +11946,7 @@
             </a:ln>
             <a:extLst>
               <a:ext uri="{91240B29-F687-4f45-9708-019B960494DF}">
-                <a14:hiddenLine xmlns:a14="http://schemas.microsoft.com/office/drawing/2010/main" xmlns="" w="9525">
+                <a14:hiddenLine xmlns="" xmlns:a14="http://schemas.microsoft.com/office/drawing/2010/main" w="9525">
                   <a:solidFill>
                     <a:srgbClr val="000000"/>
                   </a:solidFill>
@@ -11996,7 +12011,7 @@
             </a:ln>
             <a:extLst>
               <a:ext uri="{91240B29-F687-4f45-9708-019B960494DF}">
-                <a14:hiddenLine xmlns:a14="http://schemas.microsoft.com/office/drawing/2010/main" xmlns="" w="9525">
+                <a14:hiddenLine xmlns="" xmlns:a14="http://schemas.microsoft.com/office/drawing/2010/main" w="9525">
                   <a:solidFill>
                     <a:srgbClr val="000000"/>
                   </a:solidFill>
@@ -12058,7 +12073,7 @@
             </a:ln>
             <a:extLst>
               <a:ext uri="{91240B29-F687-4f45-9708-019B960494DF}">
-                <a14:hiddenLine xmlns:a14="http://schemas.microsoft.com/office/drawing/2010/main" xmlns="" w="9525">
+                <a14:hiddenLine xmlns="" xmlns:a14="http://schemas.microsoft.com/office/drawing/2010/main" w="9525">
                   <a:solidFill>
                     <a:srgbClr val="000000"/>
                   </a:solidFill>
@@ -12148,7 +12163,7 @@
             </a:ln>
             <a:extLst>
               <a:ext uri="{91240B29-F687-4f45-9708-019B960494DF}">
-                <a14:hiddenLine xmlns:a14="http://schemas.microsoft.com/office/drawing/2010/main" xmlns="" w="9525">
+                <a14:hiddenLine xmlns="" xmlns:a14="http://schemas.microsoft.com/office/drawing/2010/main" w="9525">
                   <a:solidFill>
                     <a:srgbClr val="000000"/>
                   </a:solidFill>
@@ -12238,7 +12253,7 @@
             </a:ln>
             <a:extLst>
               <a:ext uri="{91240B29-F687-4f45-9708-019B960494DF}">
-                <a14:hiddenLine xmlns:a14="http://schemas.microsoft.com/office/drawing/2010/main" xmlns="" w="9525">
+                <a14:hiddenLine xmlns="" xmlns:a14="http://schemas.microsoft.com/office/drawing/2010/main" w="9525">
                   <a:solidFill>
                     <a:srgbClr val="000000"/>
                   </a:solidFill>
@@ -12300,7 +12315,7 @@
             </a:ln>
             <a:extLst>
               <a:ext uri="{91240B29-F687-4f45-9708-019B960494DF}">
-                <a14:hiddenLine xmlns:a14="http://schemas.microsoft.com/office/drawing/2010/main" xmlns="" w="9525">
+                <a14:hiddenLine xmlns="" xmlns:a14="http://schemas.microsoft.com/office/drawing/2010/main" w="9525">
                   <a:solidFill>
                     <a:srgbClr val="000000"/>
                   </a:solidFill>
@@ -12420,7 +12435,7 @@
             </a:ln>
             <a:extLst>
               <a:ext uri="{91240B29-F687-4f45-9708-019B960494DF}">
-                <a14:hiddenLine xmlns:a14="http://schemas.microsoft.com/office/drawing/2010/main" xmlns="" w="9525">
+                <a14:hiddenLine xmlns="" xmlns:a14="http://schemas.microsoft.com/office/drawing/2010/main" w="9525">
                   <a:solidFill>
                     <a:srgbClr val="000000"/>
                   </a:solidFill>
@@ -12488,7 +12503,7 @@
             </a:ln>
             <a:extLst>
               <a:ext uri="{91240B29-F687-4f45-9708-019B960494DF}">
-                <a14:hiddenLine xmlns:a14="http://schemas.microsoft.com/office/drawing/2010/main" xmlns="" w="9525">
+                <a14:hiddenLine xmlns="" xmlns:a14="http://schemas.microsoft.com/office/drawing/2010/main" w="9525">
                   <a:solidFill>
                     <a:srgbClr val="000000"/>
                   </a:solidFill>
@@ -12578,7 +12593,7 @@
             </a:ln>
             <a:extLst>
               <a:ext uri="{91240B29-F687-4f45-9708-019B960494DF}">
-                <a14:hiddenLine xmlns:a14="http://schemas.microsoft.com/office/drawing/2010/main" xmlns="" w="9525">
+                <a14:hiddenLine xmlns="" xmlns:a14="http://schemas.microsoft.com/office/drawing/2010/main" w="9525">
                   <a:solidFill>
                     <a:srgbClr val="000000"/>
                   </a:solidFill>
@@ -17392,7 +17407,7 @@
           <a:noFill/>
           <a:extLst>
             <a:ext uri="{909E8E84-426E-40dd-AFC4-6F175D3DCCD1}">
-              <a14:hiddenFill xmlns:a14="http://schemas.microsoft.com/office/drawing/2010/main" xmlns="">
+              <a14:hiddenFill xmlns="" xmlns:a14="http://schemas.microsoft.com/office/drawing/2010/main">
                 <a:solidFill>
                   <a:srgbClr val="FFFFFF"/>
                 </a:solidFill>
@@ -17466,7 +17481,7 @@
               </a:ln>
               <a:extLst>
                 <a:ext uri="{91240B29-F687-4f45-9708-019B960494DF}">
-                  <a14:hiddenLine xmlns:a14="http://schemas.microsoft.com/office/drawing/2010/main" xmlns="" w="9525">
+                  <a14:hiddenLine xmlns="" xmlns:a14="http://schemas.microsoft.com/office/drawing/2010/main" w="9525">
                     <a:solidFill>
                       <a:srgbClr val="000000"/>
                     </a:solidFill>
@@ -17556,7 +17571,7 @@
               </a:ln>
               <a:extLst>
                 <a:ext uri="{91240B29-F687-4f45-9708-019B960494DF}">
-                  <a14:hiddenLine xmlns:a14="http://schemas.microsoft.com/office/drawing/2010/main" xmlns="" w="9525">
+                  <a14:hiddenLine xmlns="" xmlns:a14="http://schemas.microsoft.com/office/drawing/2010/main" w="9525">
                     <a:solidFill>
                       <a:srgbClr val="000000"/>
                     </a:solidFill>
@@ -17646,7 +17661,7 @@
               </a:ln>
               <a:extLst>
                 <a:ext uri="{91240B29-F687-4f45-9708-019B960494DF}">
-                  <a14:hiddenLine xmlns:a14="http://schemas.microsoft.com/office/drawing/2010/main" xmlns="" w="9525">
+                  <a14:hiddenLine xmlns="" xmlns:a14="http://schemas.microsoft.com/office/drawing/2010/main" w="9525">
                     <a:solidFill>
                       <a:srgbClr val="000000"/>
                     </a:solidFill>
@@ -17708,7 +17723,7 @@
               </a:ln>
               <a:extLst>
                 <a:ext uri="{91240B29-F687-4f45-9708-019B960494DF}">
-                  <a14:hiddenLine xmlns:a14="http://schemas.microsoft.com/office/drawing/2010/main" xmlns="" w="9525">
+                  <a14:hiddenLine xmlns="" xmlns:a14="http://schemas.microsoft.com/office/drawing/2010/main" w="9525">
                     <a:solidFill>
                       <a:srgbClr val="000000"/>
                     </a:solidFill>
@@ -17798,7 +17813,7 @@
               </a:ln>
               <a:extLst>
                 <a:ext uri="{91240B29-F687-4f45-9708-019B960494DF}">
-                  <a14:hiddenLine xmlns:a14="http://schemas.microsoft.com/office/drawing/2010/main" xmlns="" w="9525">
+                  <a14:hiddenLine xmlns="" xmlns:a14="http://schemas.microsoft.com/office/drawing/2010/main" w="9525">
                     <a:solidFill>
                       <a:srgbClr val="000000"/>
                     </a:solidFill>
@@ -17860,7 +17875,7 @@
               </a:ln>
               <a:extLst>
                 <a:ext uri="{91240B29-F687-4f45-9708-019B960494DF}">
-                  <a14:hiddenLine xmlns:a14="http://schemas.microsoft.com/office/drawing/2010/main" xmlns="" w="9525">
+                  <a14:hiddenLine xmlns="" xmlns:a14="http://schemas.microsoft.com/office/drawing/2010/main" w="9525">
                     <a:solidFill>
                       <a:srgbClr val="000000"/>
                     </a:solidFill>
@@ -17922,7 +17937,7 @@
               </a:ln>
               <a:extLst>
                 <a:ext uri="{91240B29-F687-4f45-9708-019B960494DF}">
-                  <a14:hiddenLine xmlns:a14="http://schemas.microsoft.com/office/drawing/2010/main" xmlns="" w="9525">
+                  <a14:hiddenLine xmlns="" xmlns:a14="http://schemas.microsoft.com/office/drawing/2010/main" w="9525">
                     <a:solidFill>
                       <a:srgbClr val="000000"/>
                     </a:solidFill>
@@ -18012,7 +18027,7 @@
               </a:ln>
               <a:extLst>
                 <a:ext uri="{91240B29-F687-4f45-9708-019B960494DF}">
-                  <a14:hiddenLine xmlns:a14="http://schemas.microsoft.com/office/drawing/2010/main" xmlns="" w="9525">
+                  <a14:hiddenLine xmlns="" xmlns:a14="http://schemas.microsoft.com/office/drawing/2010/main" w="9525">
                     <a:solidFill>
                       <a:srgbClr val="000000"/>
                     </a:solidFill>
@@ -18102,7 +18117,7 @@
               </a:ln>
               <a:extLst>
                 <a:ext uri="{91240B29-F687-4f45-9708-019B960494DF}">
-                  <a14:hiddenLine xmlns:a14="http://schemas.microsoft.com/office/drawing/2010/main" xmlns="" w="9525">
+                  <a14:hiddenLine xmlns="" xmlns:a14="http://schemas.microsoft.com/office/drawing/2010/main" w="9525">
                     <a:solidFill>
                       <a:srgbClr val="000000"/>
                     </a:solidFill>
@@ -18164,7 +18179,7 @@
               </a:ln>
               <a:extLst>
                 <a:ext uri="{91240B29-F687-4f45-9708-019B960494DF}">
-                  <a14:hiddenLine xmlns:a14="http://schemas.microsoft.com/office/drawing/2010/main" xmlns="" w="9525">
+                  <a14:hiddenLine xmlns="" xmlns:a14="http://schemas.microsoft.com/office/drawing/2010/main" w="9525">
                     <a:solidFill>
                       <a:srgbClr val="000000"/>
                     </a:solidFill>
@@ -18274,7 +18289,7 @@
               </a:ln>
               <a:extLst>
                 <a:ext uri="{91240B29-F687-4f45-9708-019B960494DF}">
-                  <a14:hiddenLine xmlns:a14="http://schemas.microsoft.com/office/drawing/2010/main" xmlns="" w="9525">
+                  <a14:hiddenLine xmlns="" xmlns:a14="http://schemas.microsoft.com/office/drawing/2010/main" w="9525">
                     <a:solidFill>
                       <a:srgbClr val="000000"/>
                     </a:solidFill>
@@ -18358,7 +18373,7 @@
               </a:ln>
               <a:extLst>
                 <a:ext uri="{91240B29-F687-4f45-9708-019B960494DF}">
-                  <a14:hiddenLine xmlns:a14="http://schemas.microsoft.com/office/drawing/2010/main" xmlns="" w="9525">
+                  <a14:hiddenLine xmlns="" xmlns:a14="http://schemas.microsoft.com/office/drawing/2010/main" w="9525">
                     <a:solidFill>
                       <a:srgbClr val="000000"/>
                     </a:solidFill>
@@ -18420,7 +18435,7 @@
               </a:ln>
               <a:extLst>
                 <a:ext uri="{91240B29-F687-4f45-9708-019B960494DF}">
-                  <a14:hiddenLine xmlns:a14="http://schemas.microsoft.com/office/drawing/2010/main" xmlns="" w="9525">
+                  <a14:hiddenLine xmlns="" xmlns:a14="http://schemas.microsoft.com/office/drawing/2010/main" w="9525">
                     <a:solidFill>
                       <a:srgbClr val="000000"/>
                     </a:solidFill>
@@ -18482,7 +18497,7 @@
               </a:ln>
               <a:extLst>
                 <a:ext uri="{91240B29-F687-4f45-9708-019B960494DF}">
-                  <a14:hiddenLine xmlns:a14="http://schemas.microsoft.com/office/drawing/2010/main" xmlns="" w="9525">
+                  <a14:hiddenLine xmlns="" xmlns:a14="http://schemas.microsoft.com/office/drawing/2010/main" w="9525">
                     <a:solidFill>
                       <a:srgbClr val="000000"/>
                     </a:solidFill>
@@ -18572,7 +18587,7 @@
               </a:ln>
               <a:extLst>
                 <a:ext uri="{91240B29-F687-4f45-9708-019B960494DF}">
-                  <a14:hiddenLine xmlns:a14="http://schemas.microsoft.com/office/drawing/2010/main" xmlns="" w="9525">
+                  <a14:hiddenLine xmlns="" xmlns:a14="http://schemas.microsoft.com/office/drawing/2010/main" w="9525">
                     <a:solidFill>
                       <a:srgbClr val="000000"/>
                     </a:solidFill>
@@ -18606,7 +18621,7 @@
               </a:ln>
               <a:extLst>
                 <a:ext uri="{91240B29-F687-4f45-9708-019B960494DF}">
-                  <a14:hiddenLine xmlns:a14="http://schemas.microsoft.com/office/drawing/2010/main" xmlns="" w="9525">
+                  <a14:hiddenLine xmlns="" xmlns:a14="http://schemas.microsoft.com/office/drawing/2010/main" w="9525">
                     <a:solidFill>
                       <a:srgbClr val="000000"/>
                     </a:solidFill>
@@ -18671,7 +18686,7 @@
               </a:ln>
               <a:extLst>
                 <a:ext uri="{91240B29-F687-4f45-9708-019B960494DF}">
-                  <a14:hiddenLine xmlns:a14="http://schemas.microsoft.com/office/drawing/2010/main" xmlns="" w="9525">
+                  <a14:hiddenLine xmlns="" xmlns:a14="http://schemas.microsoft.com/office/drawing/2010/main" w="9525">
                     <a:solidFill>
                       <a:srgbClr val="000000"/>
                     </a:solidFill>
@@ -18761,7 +18776,7 @@
               </a:ln>
               <a:extLst>
                 <a:ext uri="{91240B29-F687-4f45-9708-019B960494DF}">
-                  <a14:hiddenLine xmlns:a14="http://schemas.microsoft.com/office/drawing/2010/main" xmlns="" w="9525">
+                  <a14:hiddenLine xmlns="" xmlns:a14="http://schemas.microsoft.com/office/drawing/2010/main" w="9525">
                     <a:solidFill>
                       <a:srgbClr val="000000"/>
                     </a:solidFill>
@@ -18823,7 +18838,7 @@
               </a:ln>
               <a:extLst>
                 <a:ext uri="{91240B29-F687-4f45-9708-019B960494DF}">
-                  <a14:hiddenLine xmlns:a14="http://schemas.microsoft.com/office/drawing/2010/main" xmlns="" w="9525">
+                  <a14:hiddenLine xmlns="" xmlns:a14="http://schemas.microsoft.com/office/drawing/2010/main" w="9525">
                     <a:solidFill>
                       <a:srgbClr val="000000"/>
                     </a:solidFill>
@@ -18913,7 +18928,7 @@
               </a:ln>
               <a:extLst>
                 <a:ext uri="{91240B29-F687-4f45-9708-019B960494DF}">
-                  <a14:hiddenLine xmlns:a14="http://schemas.microsoft.com/office/drawing/2010/main" xmlns="" w="9525">
+                  <a14:hiddenLine xmlns="" xmlns:a14="http://schemas.microsoft.com/office/drawing/2010/main" w="9525">
                     <a:solidFill>
                       <a:srgbClr val="000000"/>
                     </a:solidFill>
@@ -18978,7 +18993,7 @@
               </a:ln>
               <a:extLst>
                 <a:ext uri="{91240B29-F687-4f45-9708-019B960494DF}">
-                  <a14:hiddenLine xmlns:a14="http://schemas.microsoft.com/office/drawing/2010/main" xmlns="" w="9525">
+                  <a14:hiddenLine xmlns="" xmlns:a14="http://schemas.microsoft.com/office/drawing/2010/main" w="9525">
                     <a:solidFill>
                       <a:srgbClr val="000000"/>
                     </a:solidFill>
@@ -19040,7 +19055,7 @@
               </a:ln>
               <a:extLst>
                 <a:ext uri="{91240B29-F687-4f45-9708-019B960494DF}">
-                  <a14:hiddenLine xmlns:a14="http://schemas.microsoft.com/office/drawing/2010/main" xmlns="" w="9525">
+                  <a14:hiddenLine xmlns="" xmlns:a14="http://schemas.microsoft.com/office/drawing/2010/main" w="9525">
                     <a:solidFill>
                       <a:srgbClr val="000000"/>
                     </a:solidFill>
@@ -19130,7 +19145,7 @@
               </a:ln>
               <a:extLst>
                 <a:ext uri="{91240B29-F687-4f45-9708-019B960494DF}">
-                  <a14:hiddenLine xmlns:a14="http://schemas.microsoft.com/office/drawing/2010/main" xmlns="" w="9525">
+                  <a14:hiddenLine xmlns="" xmlns:a14="http://schemas.microsoft.com/office/drawing/2010/main" w="9525">
                     <a:solidFill>
                       <a:srgbClr val="000000"/>
                     </a:solidFill>
@@ -19220,7 +19235,7 @@
               </a:ln>
               <a:extLst>
                 <a:ext uri="{91240B29-F687-4f45-9708-019B960494DF}">
-                  <a14:hiddenLine xmlns:a14="http://schemas.microsoft.com/office/drawing/2010/main" xmlns="" w="9525">
+                  <a14:hiddenLine xmlns="" xmlns:a14="http://schemas.microsoft.com/office/drawing/2010/main" w="9525">
                     <a:solidFill>
                       <a:srgbClr val="000000"/>
                     </a:solidFill>
@@ -19285,7 +19300,7 @@
               </a:ln>
               <a:extLst>
                 <a:ext uri="{91240B29-F687-4f45-9708-019B960494DF}">
-                  <a14:hiddenLine xmlns:a14="http://schemas.microsoft.com/office/drawing/2010/main" xmlns="" w="9525">
+                  <a14:hiddenLine xmlns="" xmlns:a14="http://schemas.microsoft.com/office/drawing/2010/main" w="9525">
                     <a:solidFill>
                       <a:srgbClr val="000000"/>
                     </a:solidFill>
@@ -19405,7 +19420,7 @@
               </a:ln>
               <a:extLst>
                 <a:ext uri="{91240B29-F687-4f45-9708-019B960494DF}">
-                  <a14:hiddenLine xmlns:a14="http://schemas.microsoft.com/office/drawing/2010/main" xmlns="" w="9525">
+                  <a14:hiddenLine xmlns="" xmlns:a14="http://schemas.microsoft.com/office/drawing/2010/main" w="9525">
                     <a:solidFill>
                       <a:srgbClr val="000000"/>
                     </a:solidFill>
@@ -19486,7 +19501,7 @@
               </a:ln>
               <a:extLst>
                 <a:ext uri="{91240B29-F687-4f45-9708-019B960494DF}">
-                  <a14:hiddenLine xmlns:a14="http://schemas.microsoft.com/office/drawing/2010/main" xmlns="" w="9525">
+                  <a14:hiddenLine xmlns="" xmlns:a14="http://schemas.microsoft.com/office/drawing/2010/main" w="9525">
                     <a:solidFill>
                       <a:srgbClr val="000000"/>
                     </a:solidFill>
@@ -19601,7 +19616,7 @@
               </a:ln>
               <a:extLst>
                 <a:ext uri="{91240B29-F687-4f45-9708-019B960494DF}">
-                  <a14:hiddenLine xmlns:a14="http://schemas.microsoft.com/office/drawing/2010/main" xmlns="" w="9525">
+                  <a14:hiddenLine xmlns="" xmlns:a14="http://schemas.microsoft.com/office/drawing/2010/main" w="9525">
                     <a:solidFill>
                       <a:srgbClr val="000000"/>
                     </a:solidFill>
@@ -19691,7 +19706,7 @@
               </a:ln>
               <a:extLst>
                 <a:ext uri="{91240B29-F687-4f45-9708-019B960494DF}">
-                  <a14:hiddenLine xmlns:a14="http://schemas.microsoft.com/office/drawing/2010/main" xmlns="" w="9525">
+                  <a14:hiddenLine xmlns="" xmlns:a14="http://schemas.microsoft.com/office/drawing/2010/main" w="9525">
                     <a:solidFill>
                       <a:srgbClr val="000000"/>
                     </a:solidFill>
@@ -19756,7 +19771,7 @@
               </a:ln>
               <a:extLst>
                 <a:ext uri="{91240B29-F687-4f45-9708-019B960494DF}">
-                  <a14:hiddenLine xmlns:a14="http://schemas.microsoft.com/office/drawing/2010/main" xmlns="" w="9525">
+                  <a14:hiddenLine xmlns="" xmlns:a14="http://schemas.microsoft.com/office/drawing/2010/main" w="9525">
                     <a:solidFill>
                       <a:srgbClr val="000000"/>
                     </a:solidFill>
@@ -19846,7 +19861,7 @@
               </a:ln>
               <a:extLst>
                 <a:ext uri="{91240B29-F687-4f45-9708-019B960494DF}">
-                  <a14:hiddenLine xmlns:a14="http://schemas.microsoft.com/office/drawing/2010/main" xmlns="" w="9525">
+                  <a14:hiddenLine xmlns="" xmlns:a14="http://schemas.microsoft.com/office/drawing/2010/main" w="9525">
                     <a:solidFill>
                       <a:srgbClr val="000000"/>
                     </a:solidFill>
@@ -19914,7 +19929,7 @@
               </a:ln>
               <a:extLst>
                 <a:ext uri="{91240B29-F687-4f45-9708-019B960494DF}">
-                  <a14:hiddenLine xmlns:a14="http://schemas.microsoft.com/office/drawing/2010/main" xmlns="" w="9525">
+                  <a14:hiddenLine xmlns="" xmlns:a14="http://schemas.microsoft.com/office/drawing/2010/main" w="9525">
                     <a:solidFill>
                       <a:srgbClr val="000000"/>
                     </a:solidFill>
@@ -20004,7 +20019,7 @@
               </a:ln>
               <a:extLst>
                 <a:ext uri="{91240B29-F687-4f45-9708-019B960494DF}">
-                  <a14:hiddenLine xmlns:a14="http://schemas.microsoft.com/office/drawing/2010/main" xmlns="" w="9525">
+                  <a14:hiddenLine xmlns="" xmlns:a14="http://schemas.microsoft.com/office/drawing/2010/main" w="9525">
                     <a:solidFill>
                       <a:srgbClr val="000000"/>
                     </a:solidFill>
@@ -20072,7 +20087,7 @@
               </a:ln>
               <a:extLst>
                 <a:ext uri="{91240B29-F687-4f45-9708-019B960494DF}">
-                  <a14:hiddenLine xmlns:a14="http://schemas.microsoft.com/office/drawing/2010/main" xmlns="" w="9525">
+                  <a14:hiddenLine xmlns="" xmlns:a14="http://schemas.microsoft.com/office/drawing/2010/main" w="9525">
                     <a:solidFill>
                       <a:srgbClr val="000000"/>
                     </a:solidFill>
@@ -20162,7 +20177,7 @@
               </a:ln>
               <a:extLst>
                 <a:ext uri="{91240B29-F687-4f45-9708-019B960494DF}">
-                  <a14:hiddenLine xmlns:a14="http://schemas.microsoft.com/office/drawing/2010/main" xmlns="" w="9525">
+                  <a14:hiddenLine xmlns="" xmlns:a14="http://schemas.microsoft.com/office/drawing/2010/main" w="9525">
                     <a:solidFill>
                       <a:srgbClr val="000000"/>
                     </a:solidFill>
@@ -20196,7 +20211,7 @@
               </a:ln>
               <a:extLst>
                 <a:ext uri="{91240B29-F687-4f45-9708-019B960494DF}">
-                  <a14:hiddenLine xmlns:a14="http://schemas.microsoft.com/office/drawing/2010/main" xmlns="" w="9525">
+                  <a14:hiddenLine xmlns="" xmlns:a14="http://schemas.microsoft.com/office/drawing/2010/main" w="9525">
                     <a:solidFill>
                       <a:srgbClr val="000000"/>
                     </a:solidFill>
@@ -22564,8 +22579,8 @@
         </p:nvSpPr>
         <p:spPr>
           <a:xfrm>
-            <a:off x="1446334" y="3982914"/>
-            <a:ext cx="7992207" cy="646331"/>
+            <a:off x="1484207" y="3718679"/>
+            <a:ext cx="7992207" cy="2585323"/>
           </a:xfrm>
           <a:prstGeom prst="rect">
             <a:avLst/>
@@ -22578,10 +22593,78 @@
           </a:bodyPr>
           <a:lstStyle/>
           <a:p>
+            <a:pPr marL="285750" indent="-285750">
+              <a:buFont typeface="Wingdings" panose="05000000000000000000" pitchFamily="2" charset="2"/>
+              <a:buChar char="§"/>
+            </a:pPr>
             <a:r>
-              <a:rPr lang="en-US" dirty="0"/>
-              <a:t>Features with the highest weightings were related to the educational attainment levels of the population. </a:t>
+              <a:rPr lang="en-US" b="0" i="0" dirty="0">
+                <a:effectLst/>
+                <a:latin typeface="Slack-Lato"/>
+              </a:rPr>
+              <a:t>Multiple Linear Regression is a generalization of Linear Regression, in which there is more than one feature variable for the single outcome variable. </a:t>
             </a:r>
+            <a:endParaRPr lang="en-US" dirty="0"/>
+          </a:p>
+          <a:p>
+            <a:pPr marL="285750" indent="-285750">
+              <a:buFont typeface="Wingdings" panose="05000000000000000000" pitchFamily="2" charset="2"/>
+              <a:buChar char="§"/>
+            </a:pPr>
+            <a:r>
+              <a:rPr lang="en-US" b="0" i="0" dirty="0">
+                <a:effectLst/>
+                <a:latin typeface="Slack-Lato"/>
+              </a:rPr>
+              <a:t>For each feature in our dataset, there is a corresponding weight that effects the outcome y. </a:t>
+            </a:r>
+          </a:p>
+          <a:p>
+            <a:pPr marL="742950" lvl="1" indent="-285750">
+              <a:buFont typeface="Wingdings" panose="05000000000000000000" pitchFamily="2" charset="2"/>
+              <a:buChar char="§"/>
+            </a:pPr>
+            <a:r>
+              <a:rPr lang="en-US" b="0" i="0" dirty="0">
+                <a:effectLst/>
+                <a:latin typeface="Slack-Lato"/>
+              </a:rPr>
+              <a:t>Some weights are positive, while others are negative. </a:t>
+            </a:r>
+          </a:p>
+          <a:p>
+            <a:pPr marL="742950" lvl="1" indent="-285750">
+              <a:buFont typeface="Wingdings" panose="05000000000000000000" pitchFamily="2" charset="2"/>
+              <a:buChar char="§"/>
+            </a:pPr>
+            <a:r>
+              <a:rPr lang="en-US" b="0" i="0" dirty="0">
+                <a:effectLst/>
+                <a:latin typeface="Slack-Lato"/>
+              </a:rPr>
+              <a:t>Together the weights add up and give the predicted outcome for our model.</a:t>
+            </a:r>
+          </a:p>
+          <a:p>
+            <a:pPr marL="742950" lvl="1" indent="-285750">
+              <a:buFont typeface="Wingdings" panose="05000000000000000000" pitchFamily="2" charset="2"/>
+              <a:buChar char="§"/>
+            </a:pPr>
+            <a:r>
+              <a:rPr lang="en-US" b="0" i="0" dirty="0">
+                <a:effectLst/>
+                <a:latin typeface="Slack-Lato"/>
+              </a:rPr>
+              <a:t>The degree to which the weights give the final product are measured by their scale; Greater values have more of an impact than lesser values.</a:t>
+            </a:r>
+            <a:endParaRPr lang="en-US" dirty="0"/>
+          </a:p>
+          <a:p>
+            <a:pPr marL="285750" indent="-285750">
+              <a:buFont typeface="Wingdings" panose="05000000000000000000" pitchFamily="2" charset="2"/>
+              <a:buChar char="§"/>
+            </a:pPr>
+            <a:endParaRPr lang="en-US" dirty="0"/>
           </a:p>
         </p:txBody>
       </p:sp>
@@ -24388,20 +24471,20 @@
 </file>
 
 <file path=customXml/item1.xml><?xml version="1.0" encoding="utf-8"?>
+<p:properties xmlns:p="http://schemas.microsoft.com/office/2006/metadata/properties" xmlns:xsi="http://www.w3.org/2001/XMLSchema-instance" xmlns:pc="http://schemas.microsoft.com/office/infopath/2007/PartnerControls">
+  <documentManagement>
+    <MediaServiceKeyPoints xmlns="71af3243-3dd4-4a8d-8c0d-dd76da1f02a5" xsi:nil="true"/>
+  </documentManagement>
+</p:properties>
+</file>
+
+<file path=customXml/item2.xml><?xml version="1.0" encoding="utf-8"?>
 <?mso-contentType ?>
 <FormTemplates xmlns="http://schemas.microsoft.com/sharepoint/v3/contenttype/forms">
   <Display>DocumentLibraryForm</Display>
   <Edit>DocumentLibraryForm</Edit>
   <New>DocumentLibraryForm</New>
 </FormTemplates>
-</file>
-
-<file path=customXml/item2.xml><?xml version="1.0" encoding="utf-8"?>
-<p:properties xmlns:p="http://schemas.microsoft.com/office/2006/metadata/properties" xmlns:xsi="http://www.w3.org/2001/XMLSchema-instance" xmlns:pc="http://schemas.microsoft.com/office/infopath/2007/PartnerControls">
-  <documentManagement>
-    <MediaServiceKeyPoints xmlns="71af3243-3dd4-4a8d-8c0d-dd76da1f02a5" xsi:nil="true"/>
-  </documentManagement>
-</p:properties>
 </file>
 
 <file path=customXml/item3.xml><?xml version="1.0" encoding="utf-8"?>
@@ -24616,19 +24699,19 @@
 </file>
 
 <file path=customXml/itemProps1.xml><?xml version="1.0" encoding="utf-8"?>
-<ds:datastoreItem xmlns:ds="http://schemas.openxmlformats.org/officeDocument/2006/customXml" ds:itemID="{B579702B-25C7-40D7-9E29-7686B11A9660}">
+<ds:datastoreItem xmlns:ds="http://schemas.openxmlformats.org/officeDocument/2006/customXml" ds:itemID="{E7866CFD-F94E-4AE5-ACEA-86FEC0F48A10}">
   <ds:schemaRefs>
-    <ds:schemaRef ds:uri="http://schemas.microsoft.com/sharepoint/v3/contenttype/forms"/>
+    <ds:schemaRef ds:uri="http://schemas.microsoft.com/office/2006/metadata/properties"/>
+    <ds:schemaRef ds:uri="http://schemas.microsoft.com/office/infopath/2007/PartnerControls"/>
+    <ds:schemaRef ds:uri="71af3243-3dd4-4a8d-8c0d-dd76da1f02a5"/>
   </ds:schemaRefs>
 </ds:datastoreItem>
 </file>
 
 <file path=customXml/itemProps2.xml><?xml version="1.0" encoding="utf-8"?>
-<ds:datastoreItem xmlns:ds="http://schemas.openxmlformats.org/officeDocument/2006/customXml" ds:itemID="{E7866CFD-F94E-4AE5-ACEA-86FEC0F48A10}">
+<ds:datastoreItem xmlns:ds="http://schemas.openxmlformats.org/officeDocument/2006/customXml" ds:itemID="{B579702B-25C7-40D7-9E29-7686B11A9660}">
   <ds:schemaRefs>
-    <ds:schemaRef ds:uri="http://schemas.microsoft.com/office/2006/metadata/properties"/>
-    <ds:schemaRef ds:uri="http://schemas.microsoft.com/office/infopath/2007/PartnerControls"/>
-    <ds:schemaRef ds:uri="71af3243-3dd4-4a8d-8c0d-dd76da1f02a5"/>
+    <ds:schemaRef ds:uri="http://schemas.microsoft.com/sharepoint/v3/contenttype/forms"/>
   </ds:schemaRefs>
 </ds:datastoreItem>
 </file>

</xml_diff>